<commit_message>
added Job Market slide; updated client side to remove Pittsburgh, Las Vegas
</commit_message>
<xml_diff>
--- a/Project1_Presentation.pptx
+++ b/Project1_Presentation.pptx
@@ -14,7 +14,7 @@
     <p:sldId id="279" r:id="rId5"/>
     <p:sldId id="257" r:id="rId6"/>
     <p:sldId id="281" r:id="rId7"/>
-    <p:sldId id="286" r:id="rId8"/>
+    <p:sldId id="287" r:id="rId8"/>
     <p:sldId id="284" r:id="rId9"/>
     <p:sldId id="282" r:id="rId10"/>
     <p:sldId id="285" r:id="rId11"/>
@@ -1012,7 +1012,7 @@
           <a:p>
             <a:fld id="{86252186-C111-43A8-A0F7-F77FFDE4DF82}" type="datetimeFigureOut">
               <a:rPr lang="en-US" smtClean="0"/>
-              <a:t>7/26/2023</a:t>
+              <a:t>7/28/2023</a:t>
             </a:fld>
             <a:endParaRPr lang="en-US" dirty="0"/>
           </a:p>
@@ -1189,7 +1189,7 @@
           <a:p>
             <a:fld id="{7E2BBB5B-F3DE-41D7-B279-483D20E8E363}" type="datetimeFigureOut">
               <a:rPr lang="en-US" smtClean="0"/>
-              <a:t>7/26/2023</a:t>
+              <a:t>7/28/2023</a:t>
             </a:fld>
             <a:endParaRPr lang="en-US" dirty="0"/>
           </a:p>
@@ -1454,6 +1454,152 @@
     </a:lvl9pPr>
   </p:notesStyle>
 </p:notesMaster>
+</file>
+
+<file path=ppt/notesSlides/notesSlide1.xml><?xml version="1.0" encoding="utf-8"?>
+<p:notes xmlns:a="http://schemas.openxmlformats.org/drawingml/2006/main" xmlns:r="http://schemas.openxmlformats.org/officeDocument/2006/relationships" xmlns:p="http://schemas.openxmlformats.org/presentationml/2006/main">
+  <p:cSld>
+    <p:spTree>
+      <p:nvGrpSpPr>
+        <p:cNvPr id="1" name=""/>
+        <p:cNvGrpSpPr/>
+        <p:nvPr/>
+      </p:nvGrpSpPr>
+      <p:grpSpPr>
+        <a:xfrm>
+          <a:off x="0" y="0"/>
+          <a:ext cx="0" cy="0"/>
+          <a:chOff x="0" y="0"/>
+          <a:chExt cx="0" cy="0"/>
+        </a:xfrm>
+      </p:grpSpPr>
+      <p:sp>
+        <p:nvSpPr>
+          <p:cNvPr id="2" name="Slide Image Placeholder 1"/>
+          <p:cNvSpPr>
+            <a:spLocks noGrp="1" noRot="1" noChangeAspect="1"/>
+          </p:cNvSpPr>
+          <p:nvPr>
+            <p:ph type="sldImg"/>
+          </p:nvPr>
+        </p:nvSpPr>
+        <p:spPr/>
+      </p:sp>
+      <p:sp>
+        <p:nvSpPr>
+          <p:cNvPr id="3" name="Notes Placeholder 2"/>
+          <p:cNvSpPr>
+            <a:spLocks noGrp="1"/>
+          </p:cNvSpPr>
+          <p:nvPr>
+            <p:ph type="body" idx="1"/>
+          </p:nvPr>
+        </p:nvSpPr>
+        <p:spPr/>
+        <p:txBody>
+          <a:bodyPr/>
+          <a:lstStyle/>
+          <a:p>
+            <a:r>
+              <a:rPr lang="en-US" dirty="0"/>
+              <a:t>Other Notes: </a:t>
+            </a:r>
+          </a:p>
+          <a:p>
+            <a:r>
+              <a:rPr lang="en-US" dirty="0"/>
+              <a:t>Unemployment:</a:t>
+            </a:r>
+          </a:p>
+          <a:p>
+            <a:pPr marL="171450" indent="-171450">
+              <a:buFont typeface="Arial" panose="020B0604020202020204" pitchFamily="34" charset="0"/>
+              <a:buChar char="•"/>
+            </a:pPr>
+            <a:r>
+              <a:rPr lang="en-US" dirty="0"/>
+              <a:t>Denver, Austin, San Francisco are different (p-value: 0.178)</a:t>
+            </a:r>
+          </a:p>
+          <a:p>
+            <a:pPr marL="171450" indent="-171450">
+              <a:buFont typeface="Arial" panose="020B0604020202020204" pitchFamily="34" charset="0"/>
+              <a:buChar char="•"/>
+            </a:pPr>
+            <a:r>
+              <a:rPr lang="en-US" dirty="0"/>
+              <a:t>Denver &amp; Austin are on the edge of being different (p-value: 0.053)</a:t>
+            </a:r>
+          </a:p>
+          <a:p>
+            <a:r>
+              <a:rPr lang="en-US" dirty="0"/>
+              <a:t>Job Openings:</a:t>
+            </a:r>
+          </a:p>
+          <a:p>
+            <a:pPr marL="171450" indent="-171450">
+              <a:buFont typeface="Arial" panose="020B0604020202020204" pitchFamily="34" charset="0"/>
+              <a:buChar char="•"/>
+            </a:pPr>
+            <a:r>
+              <a:rPr lang="en-US" dirty="0"/>
+              <a:t>Texas, Illinois, California are different (p-value: 0.854)</a:t>
+            </a:r>
+          </a:p>
+          <a:p>
+            <a:pPr marL="171450" indent="-171450">
+              <a:buFont typeface="Arial" panose="020B0604020202020204" pitchFamily="34" charset="0"/>
+              <a:buChar char="•"/>
+            </a:pPr>
+            <a:r>
+              <a:rPr lang="en-US" dirty="0"/>
+              <a:t>Texas and Illinois are different (p-value: 905)</a:t>
+            </a:r>
+          </a:p>
+          <a:p>
+            <a:pPr marL="0" indent="0">
+              <a:buFont typeface="Arial" panose="020B0604020202020204" pitchFamily="34" charset="0"/>
+              <a:buNone/>
+            </a:pPr>
+            <a:endParaRPr lang="en-US" dirty="0"/>
+          </a:p>
+        </p:txBody>
+      </p:sp>
+      <p:sp>
+        <p:nvSpPr>
+          <p:cNvPr id="4" name="Slide Number Placeholder 3"/>
+          <p:cNvSpPr>
+            <a:spLocks noGrp="1"/>
+          </p:cNvSpPr>
+          <p:nvPr>
+            <p:ph type="sldNum" sz="quarter" idx="5"/>
+          </p:nvPr>
+        </p:nvSpPr>
+        <p:spPr/>
+        <p:txBody>
+          <a:bodyPr/>
+          <a:lstStyle/>
+          <a:p>
+            <a:fld id="{F5B62BC0-7DC4-4569-951D-2BB9475345C6}" type="slidenum">
+              <a:rPr lang="en-US" smtClean="0"/>
+              <a:t>4</a:t>
+            </a:fld>
+            <a:endParaRPr lang="en-US" dirty="0"/>
+          </a:p>
+        </p:txBody>
+      </p:sp>
+    </p:spTree>
+    <p:extLst>
+      <p:ext uri="{BB962C8B-B14F-4D97-AF65-F5344CB8AC3E}">
+        <p14:creationId xmlns:p14="http://schemas.microsoft.com/office/powerpoint/2010/main" val="3650808525"/>
+      </p:ext>
+    </p:extLst>
+  </p:cSld>
+  <p:clrMapOvr>
+    <a:masterClrMapping/>
+  </p:clrMapOvr>
+</p:notes>
 </file>
 
 <file path=ppt/slideLayouts/slideLayout1.xml><?xml version="1.0" encoding="utf-8"?>
@@ -35920,12 +36066,8 @@
           <a:lstStyle/>
           <a:p>
             <a:r>
-              <a:rPr lang="en-US" dirty="0" err="1"/>
-              <a:t>TaRGET</a:t>
-            </a:r>
-            <a:r>
-              <a:rPr lang="en-US" dirty="0"/>
-              <a:t> Cities</a:t>
+              <a:rPr lang="en-US" dirty="0"/>
+              <a:t>Target Cities</a:t>
             </a:r>
           </a:p>
         </p:txBody>
@@ -35958,7 +36100,7 @@
           <a:p>
             <a:r>
               <a:rPr lang="en-US" dirty="0"/>
-              <a:t>Austin, Chicago, Denver , Las Vegas, Memphis, New York, Pittsburgh, San Francisco </a:t>
+              <a:t>Austin, Chicago, Denver, Memphis, New York, San Francisco </a:t>
             </a:r>
           </a:p>
         </p:txBody>
@@ -36078,7 +36220,7 @@
             </a:pPr>
             <a:r>
               <a:rPr lang="en-US" dirty="0"/>
-              <a:t>Evidence rental prices competitive to mortgage and taxes</a:t>
+              <a:t>Evidence rental prices competitive to mortgage</a:t>
             </a:r>
           </a:p>
         </p:txBody>
@@ -36169,6 +36311,16 @@
             <a:r>
               <a:rPr lang="en-US" dirty="0"/>
               <a:t>Positive Job Market</a:t>
+            </a:r>
+          </a:p>
+          <a:p>
+            <a:pPr marL="285750" indent="-285750">
+              <a:buFont typeface="Arial" panose="020B0604020202020204" pitchFamily="34" charset="0"/>
+              <a:buChar char="•"/>
+            </a:pPr>
+            <a:r>
+              <a:rPr lang="en-US" dirty="0"/>
+              <a:t>Property tax implications</a:t>
             </a:r>
           </a:p>
         </p:txBody>
@@ -36671,8 +36823,8 @@
           <a:p>
             <a:pPr algn="l"/>
             <a:r>
-              <a:rPr lang="en-US" dirty="0"/>
-              <a:t>Conclusion 1</a:t>
+              <a:rPr lang="en-US" sz="1600" dirty="0"/>
+              <a:t>Austin, San Francisco, Denver</a:t>
             </a:r>
           </a:p>
         </p:txBody>
@@ -36695,8 +36847,8 @@
         </p:nvSpPr>
         <p:spPr>
           <a:xfrm>
-            <a:off x="681487" y="2329131"/>
-            <a:ext cx="4554747" cy="836583"/>
+            <a:off x="681487" y="2329132"/>
+            <a:ext cx="4554747" cy="547196"/>
           </a:xfrm>
         </p:spPr>
         <p:txBody>
@@ -36705,7 +36857,7 @@
           <a:p>
             <a:r>
               <a:rPr lang="en-US" dirty="0"/>
-              <a:t>TBD…</a:t>
+              <a:t>Have the lowest unemployment rates of the target cities.</a:t>
             </a:r>
           </a:p>
         </p:txBody>
@@ -36738,8 +36890,8 @@
           <a:p>
             <a:pPr algn="l"/>
             <a:r>
-              <a:rPr lang="en-US" dirty="0"/>
-              <a:t>Conclusion 2</a:t>
+              <a:rPr lang="en-US" sz="1600" dirty="0"/>
+              <a:t>Tennessee, Colorado, Texas</a:t>
             </a:r>
           </a:p>
         </p:txBody>
@@ -36762,8 +36914,8 @@
         </p:nvSpPr>
         <p:spPr>
           <a:xfrm>
-            <a:off x="681487" y="3712909"/>
-            <a:ext cx="4554746" cy="836583"/>
+            <a:off x="681487" y="3712910"/>
+            <a:ext cx="4554746" cy="567820"/>
           </a:xfrm>
         </p:spPr>
         <p:txBody>
@@ -36772,7 +36924,7 @@
           <a:p>
             <a:r>
               <a:rPr lang="en-US" dirty="0"/>
-              <a:t>TBD…</a:t>
+              <a:t>Have the highest job opening rate trends of the target states.</a:t>
             </a:r>
           </a:p>
         </p:txBody>
@@ -36805,8 +36957,8 @@
           <a:p>
             <a:pPr algn="l"/>
             <a:r>
-              <a:rPr lang="en-US" dirty="0"/>
-              <a:t>Conclusion 3</a:t>
+              <a:rPr lang="en-US" sz="1600" dirty="0"/>
+              <a:t>Denver, Colorado</a:t>
             </a:r>
           </a:p>
         </p:txBody>
@@ -36829,8 +36981,8 @@
         </p:nvSpPr>
         <p:spPr>
           <a:xfrm>
-            <a:off x="688363" y="5096687"/>
-            <a:ext cx="4554746" cy="836583"/>
+            <a:off x="688363" y="5096688"/>
+            <a:ext cx="4554746" cy="749874"/>
           </a:xfrm>
         </p:spPr>
         <p:txBody>
@@ -36839,7 +36991,7 @@
           <a:p>
             <a:r>
               <a:rPr lang="en-US" dirty="0"/>
-              <a:t>TBD…</a:t>
+              <a:t>Has the best overall job trend helping attract more people to the area compared to other target cities</a:t>
             </a:r>
           </a:p>
         </p:txBody>
@@ -36894,7 +37046,7 @@
           </p:nvPr>
         </p:nvPicPr>
         <p:blipFill rotWithShape="1">
-          <a:blip r:embed="rId2" cstate="screen">
+          <a:blip r:embed="rId3" cstate="screen">
             <a:extLst>
               <a:ext uri="{28A0092B-C50C-407E-A947-70E740481C1C}">
                 <a14:useLocalDpi xmlns:a14="http://schemas.microsoft.com/office/drawing/2010/main" val="0"/>
@@ -36948,40 +37100,10 @@
       </p:sp>
       <p:pic>
         <p:nvPicPr>
-          <p:cNvPr id="6" name="Picture 5" descr="A graph showing a line&#10;&#10;Description automatically generated">
-            <a:extLst>
-              <a:ext uri="{FF2B5EF4-FFF2-40B4-BE49-F238E27FC236}">
-                <a16:creationId xmlns:a16="http://schemas.microsoft.com/office/drawing/2014/main" id="{06048E3F-15C0-4C0B-9518-51F2AA7D9E2C}"/>
-              </a:ext>
-            </a:extLst>
-          </p:cNvPr>
-          <p:cNvPicPr>
-            <a:picLocks noChangeAspect="1"/>
-          </p:cNvPicPr>
-          <p:nvPr/>
-        </p:nvPicPr>
-        <p:blipFill>
-          <a:blip r:embed="rId3"/>
-          <a:stretch>
-            <a:fillRect/>
-          </a:stretch>
-        </p:blipFill>
-        <p:spPr>
-          <a:xfrm>
-            <a:off x="5523243" y="3362644"/>
-            <a:ext cx="6608373" cy="3079630"/>
-          </a:xfrm>
-          <a:prstGeom prst="rect">
-            <a:avLst/>
-          </a:prstGeom>
-        </p:spPr>
-      </p:pic>
-      <p:pic>
-        <p:nvPicPr>
-          <p:cNvPr id="8" name="Picture 7" descr="A graph of different colored lines&#10;&#10;Description automatically generated">
-            <a:extLst>
-              <a:ext uri="{FF2B5EF4-FFF2-40B4-BE49-F238E27FC236}">
-                <a16:creationId xmlns:a16="http://schemas.microsoft.com/office/drawing/2014/main" id="{AABCEE3A-708E-7F08-3F25-C15DDE2531E6}"/>
+          <p:cNvPr id="11" name="Picture 10" descr="A graph of different colored dots&#10;&#10;Description automatically generated">
+            <a:extLst>
+              <a:ext uri="{FF2B5EF4-FFF2-40B4-BE49-F238E27FC236}">
+                <a16:creationId xmlns:a16="http://schemas.microsoft.com/office/drawing/2014/main" id="{34153707-3812-9DE0-B40D-4BBDD4EBDFB4}"/>
               </a:ext>
             </a:extLst>
           </p:cNvPr>
@@ -36998,8 +37120,38 @@
         </p:blipFill>
         <p:spPr>
           <a:xfrm>
-            <a:off x="5523241" y="463191"/>
-            <a:ext cx="6608375" cy="2839496"/>
+            <a:off x="5898037" y="3265588"/>
+            <a:ext cx="6095998" cy="3047999"/>
+          </a:xfrm>
+          <a:prstGeom prst="rect">
+            <a:avLst/>
+          </a:prstGeom>
+        </p:spPr>
+      </p:pic>
+      <p:pic>
+        <p:nvPicPr>
+          <p:cNvPr id="13" name="Picture 12" descr="A graph of different colored lines&#10;&#10;Description automatically generated">
+            <a:extLst>
+              <a:ext uri="{FF2B5EF4-FFF2-40B4-BE49-F238E27FC236}">
+                <a16:creationId xmlns:a16="http://schemas.microsoft.com/office/drawing/2014/main" id="{0FDDD260-E1E5-6713-32AB-720D42720CEF}"/>
+              </a:ext>
+            </a:extLst>
+          </p:cNvPr>
+          <p:cNvPicPr>
+            <a:picLocks noChangeAspect="1"/>
+          </p:cNvPicPr>
+          <p:nvPr/>
+        </p:nvPicPr>
+        <p:blipFill>
+          <a:blip r:embed="rId5"/>
+          <a:stretch>
+            <a:fillRect/>
+          </a:stretch>
+        </p:blipFill>
+        <p:spPr>
+          <a:xfrm>
+            <a:off x="5898037" y="136525"/>
+            <a:ext cx="6095998" cy="3047999"/>
           </a:xfrm>
           <a:prstGeom prst="rect">
             <a:avLst/>
@@ -37009,7 +37161,7 @@
     </p:spTree>
     <p:extLst>
       <p:ext uri="{BB962C8B-B14F-4D97-AF65-F5344CB8AC3E}">
-        <p14:creationId xmlns:p14="http://schemas.microsoft.com/office/powerpoint/2010/main" val="473365421"/>
+        <p14:creationId xmlns:p14="http://schemas.microsoft.com/office/powerpoint/2010/main" val="312639275"/>
       </p:ext>
     </p:extLst>
   </p:cSld>
@@ -40416,35 +40568,6 @@
 </file>
 
 <file path=customXml/item1.xml><?xml version="1.0" encoding="utf-8"?>
-<p:properties xmlns:p="http://schemas.microsoft.com/office/2006/metadata/properties" xmlns:xsi="http://www.w3.org/2001/XMLSchema-instance" xmlns:pc="http://schemas.microsoft.com/office/infopath/2007/PartnerControls">
-  <documentManagement>
-    <_ip_UnifiedCompliancePolicyUIAction xmlns="http://schemas.microsoft.com/sharepoint/v3" xsi:nil="true"/>
-    <Image xmlns="71af3243-3dd4-4a8d-8c0d-dd76da1f02a5">
-      <Url xsi:nil="true"/>
-      <Description xsi:nil="true"/>
-    </Image>
-    <Status xmlns="71af3243-3dd4-4a8d-8c0d-dd76da1f02a5">Not started</Status>
-    <_ip_UnifiedCompliancePolicyProperties xmlns="http://schemas.microsoft.com/sharepoint/v3" xsi:nil="true"/>
-    <ImageTagsTaxHTField xmlns="71af3243-3dd4-4a8d-8c0d-dd76da1f02a5">
-      <Terms xmlns="http://schemas.microsoft.com/office/infopath/2007/PartnerControls"/>
-    </ImageTagsTaxHTField>
-    <TaxCatchAll xmlns="230e9df3-be65-4c73-a93b-d1236ebd677e" xsi:nil="true"/>
-    <MediaServiceKeyPoints xmlns="71af3243-3dd4-4a8d-8c0d-dd76da1f02a5" xsi:nil="true"/>
-    <Background xmlns="71af3243-3dd4-4a8d-8c0d-dd76da1f02a5">false</Background>
-  </documentManagement>
-</p:properties>
-</file>
-
-<file path=customXml/item2.xml><?xml version="1.0" encoding="utf-8"?>
-<?mso-contentType ?>
-<FormTemplates xmlns="http://schemas.microsoft.com/sharepoint/v3/contenttype/forms">
-  <Display>DocumentLibraryForm</Display>
-  <Edit>DocumentLibraryForm</Edit>
-  <New>DocumentLibraryForm</New>
-</FormTemplates>
-</file>
-
-<file path=customXml/item3.xml><?xml version="1.0" encoding="utf-8"?>
 <ct:contentTypeSchema xmlns:ct="http://schemas.microsoft.com/office/2006/metadata/contentType" xmlns:ma="http://schemas.microsoft.com/office/2006/metadata/properties/metaAttributes" ct:_="" ma:_="" ma:contentTypeName="Document" ma:contentTypeID="0x01010079F111ED35F8CC479449609E8A0923A6" ma:contentTypeVersion="27" ma:contentTypeDescription="Create a new document." ma:contentTypeScope="" ma:versionID="c6f9a84f66a9c8b9a21755b9ffafb945">
   <xsd:schema xmlns:xsd="http://www.w3.org/2001/XMLSchema" xmlns:xs="http://www.w3.org/2001/XMLSchema" xmlns:p="http://schemas.microsoft.com/office/2006/metadata/properties" xmlns:ns1="http://schemas.microsoft.com/sharepoint/v3" xmlns:ns2="71af3243-3dd4-4a8d-8c0d-dd76da1f02a5" xmlns:ns3="16c05727-aa75-4e4a-9b5f-8a80a1165891" xmlns:ns4="230e9df3-be65-4c73-a93b-d1236ebd677e" targetNamespace="http://schemas.microsoft.com/office/2006/metadata/properties" ma:root="true" ma:fieldsID="27df39e3e7036dff54f89ddd5805ce72" ns1:_="" ns2:_="" ns3:_="" ns4:_="">
     <xsd:import namespace="http://schemas.microsoft.com/sharepoint/v3"/>
@@ -40750,27 +40873,36 @@
 </ct:contentTypeSchema>
 </file>
 
-<file path=customXml/itemProps1.xml><?xml version="1.0" encoding="utf-8"?>
-<ds:datastoreItem xmlns:ds="http://schemas.openxmlformats.org/officeDocument/2006/customXml" ds:itemID="{0E439292-23DE-4FBC-B000-AFED89AC64F3}">
-  <ds:schemaRefs>
-    <ds:schemaRef ds:uri="http://schemas.microsoft.com/office/2006/metadata/properties"/>
-    <ds:schemaRef ds:uri="http://schemas.microsoft.com/office/infopath/2007/PartnerControls"/>
-    <ds:schemaRef ds:uri="http://schemas.microsoft.com/sharepoint/v3"/>
-    <ds:schemaRef ds:uri="71af3243-3dd4-4a8d-8c0d-dd76da1f02a5"/>
-    <ds:schemaRef ds:uri="230e9df3-be65-4c73-a93b-d1236ebd677e"/>
-  </ds:schemaRefs>
-</ds:datastoreItem>
+<file path=customXml/item2.xml><?xml version="1.0" encoding="utf-8"?>
+<?mso-contentType ?>
+<FormTemplates xmlns="http://schemas.microsoft.com/sharepoint/v3/contenttype/forms">
+  <Display>DocumentLibraryForm</Display>
+  <Edit>DocumentLibraryForm</Edit>
+  <New>DocumentLibraryForm</New>
+</FormTemplates>
 </file>
 
-<file path=customXml/itemProps2.xml><?xml version="1.0" encoding="utf-8"?>
-<ds:datastoreItem xmlns:ds="http://schemas.openxmlformats.org/officeDocument/2006/customXml" ds:itemID="{5F1B15C2-B622-4464-872A-FFB13E3A35CE}">
-  <ds:schemaRefs>
-    <ds:schemaRef ds:uri="http://schemas.microsoft.com/sharepoint/v3/contenttype/forms"/>
-  </ds:schemaRefs>
-</ds:datastoreItem>
+<file path=customXml/item3.xml><?xml version="1.0" encoding="utf-8"?>
+<p:properties xmlns:p="http://schemas.microsoft.com/office/2006/metadata/properties" xmlns:xsi="http://www.w3.org/2001/XMLSchema-instance" xmlns:pc="http://schemas.microsoft.com/office/infopath/2007/PartnerControls">
+  <documentManagement>
+    <_ip_UnifiedCompliancePolicyUIAction xmlns="http://schemas.microsoft.com/sharepoint/v3" xsi:nil="true"/>
+    <Image xmlns="71af3243-3dd4-4a8d-8c0d-dd76da1f02a5">
+      <Url xsi:nil="true"/>
+      <Description xsi:nil="true"/>
+    </Image>
+    <Status xmlns="71af3243-3dd4-4a8d-8c0d-dd76da1f02a5">Not started</Status>
+    <_ip_UnifiedCompliancePolicyProperties xmlns="http://schemas.microsoft.com/sharepoint/v3" xsi:nil="true"/>
+    <ImageTagsTaxHTField xmlns="71af3243-3dd4-4a8d-8c0d-dd76da1f02a5">
+      <Terms xmlns="http://schemas.microsoft.com/office/infopath/2007/PartnerControls"/>
+    </ImageTagsTaxHTField>
+    <TaxCatchAll xmlns="230e9df3-be65-4c73-a93b-d1236ebd677e" xsi:nil="true"/>
+    <MediaServiceKeyPoints xmlns="71af3243-3dd4-4a8d-8c0d-dd76da1f02a5" xsi:nil="true"/>
+    <Background xmlns="71af3243-3dd4-4a8d-8c0d-dd76da1f02a5">false</Background>
+  </documentManagement>
+</p:properties>
 </file>
 
-<file path=customXml/itemProps3.xml><?xml version="1.0" encoding="utf-8"?>
+<file path=customXml/itemProps1.xml><?xml version="1.0" encoding="utf-8"?>
 <ds:datastoreItem xmlns:ds="http://schemas.openxmlformats.org/officeDocument/2006/customXml" ds:itemID="{268D2790-C93D-4E77-87F2-435D4508ABFD}">
   <ds:schemaRefs>
     <ds:schemaRef ds:uri="http://schemas.microsoft.com/office/2006/metadata/contentType"/>
@@ -40791,6 +40923,26 @@
 </ds:datastoreItem>
 </file>
 
+<file path=customXml/itemProps2.xml><?xml version="1.0" encoding="utf-8"?>
+<ds:datastoreItem xmlns:ds="http://schemas.openxmlformats.org/officeDocument/2006/customXml" ds:itemID="{5F1B15C2-B622-4464-872A-FFB13E3A35CE}">
+  <ds:schemaRefs>
+    <ds:schemaRef ds:uri="http://schemas.microsoft.com/sharepoint/v3/contenttype/forms"/>
+  </ds:schemaRefs>
+</ds:datastoreItem>
+</file>
+
+<file path=customXml/itemProps3.xml><?xml version="1.0" encoding="utf-8"?>
+<ds:datastoreItem xmlns:ds="http://schemas.openxmlformats.org/officeDocument/2006/customXml" ds:itemID="{0E439292-23DE-4FBC-B000-AFED89AC64F3}">
+  <ds:schemaRefs>
+    <ds:schemaRef ds:uri="http://schemas.microsoft.com/office/2006/metadata/properties"/>
+    <ds:schemaRef ds:uri="http://schemas.microsoft.com/office/infopath/2007/PartnerControls"/>
+    <ds:schemaRef ds:uri="http://schemas.microsoft.com/sharepoint/v3"/>
+    <ds:schemaRef ds:uri="71af3243-3dd4-4a8d-8c0d-dd76da1f02a5"/>
+    <ds:schemaRef ds:uri="230e9df3-be65-4c73-a93b-d1236ebd677e"/>
+  </ds:schemaRefs>
+</ds:datastoreItem>
+</file>
+
 <file path=docMetadata/LabelInfo.xml><?xml version="1.0" encoding="utf-8"?>
 <clbl:labelList xmlns:clbl="http://schemas.microsoft.com/office/2020/mipLabelMetadata"/>
 </file>
</xml_diff>